<commit_message>
doc: melhoria na apresentacao eatualizacao no diagrama
</commit_message>
<xml_diff>
--- a/Documentação/Fala-Cidade_Apresentacao.pptx
+++ b/Documentação/Fala-Cidade_Apresentacao.pptx
@@ -13,8 +13,10 @@
     <p:sldId id="262" r:id="rId7"/>
     <p:sldId id="267" r:id="rId8"/>
     <p:sldId id="268" r:id="rId9"/>
-    <p:sldId id="266" r:id="rId10"/>
-    <p:sldId id="265" r:id="rId11"/>
+    <p:sldId id="269" r:id="rId10"/>
+    <p:sldId id="270" r:id="rId11"/>
+    <p:sldId id="266" r:id="rId12"/>
+    <p:sldId id="265" r:id="rId13"/>
   </p:sldIdLst>
   <p:sldSz cx="12192000" cy="6858000"/>
   <p:notesSz cx="6858000" cy="9144000"/>
@@ -285,7 +287,7 @@
           <a:p>
             <a:fld id="{6444479B-705B-4489-957E-7E8A228BDFA0}" type="datetime1">
               <a:rPr lang="en-US" smtClean="0"/>
-              <a:t>8/26/2025</a:t>
+              <a:t>9/16/2025</a:t>
             </a:fld>
             <a:endParaRPr lang="en-US"/>
           </a:p>
@@ -485,7 +487,7 @@
           <a:p>
             <a:fld id="{C07B66AD-7C08-490A-ADA4-B47E10FB2407}" type="datetime1">
               <a:rPr lang="en-US" smtClean="0"/>
-              <a:t>8/26/2025</a:t>
+              <a:t>9/16/2025</a:t>
             </a:fld>
             <a:endParaRPr lang="en-US"/>
           </a:p>
@@ -744,7 +746,7 @@
           <a:p>
             <a:fld id="{05B95027-4255-49E7-9841-CD21BCC99996}" type="datetime1">
               <a:rPr lang="en-US" smtClean="0"/>
-              <a:t>8/26/2025</a:t>
+              <a:t>9/16/2025</a:t>
             </a:fld>
             <a:endParaRPr lang="en-US"/>
           </a:p>
@@ -812,7 +814,7 @@
                 <a16:creationId xmlns:a16="http://schemas.microsoft.com/office/drawing/2014/main" id="{3230604F-219C-2DEE-830E-27274CC2FE19}"/>
               </a:ext>
               <a:ext uri="{C183D7F6-B498-43B3-948B-1728B52AA6E4}">
-                <adec:decorative xmlns:adec="http://schemas.microsoft.com/office/drawing/2017/decorative" val="1"/>
+                <adec:decorative xmlns:adec="http://schemas.microsoft.com/office/drawing/2017/decorative" xmlns="" val="1"/>
               </a:ext>
             </a:extLst>
           </p:cNvPr>
@@ -985,7 +987,7 @@
           <a:p>
             <a:fld id="{9F89F774-3FA6-43B8-9241-99959C8FD463}" type="datetime1">
               <a:rPr lang="en-US" smtClean="0"/>
-              <a:t>8/26/2025</a:t>
+              <a:t>9/16/2025</a:t>
             </a:fld>
             <a:endParaRPr lang="en-US"/>
           </a:p>
@@ -1312,7 +1314,7 @@
           <a:p>
             <a:fld id="{F9504452-5DCC-4FE2-A5C9-8A5EF6714D65}" type="datetime1">
               <a:rPr lang="en-US" smtClean="0"/>
-              <a:t>8/26/2025</a:t>
+              <a:t>9/16/2025</a:t>
             </a:fld>
             <a:endParaRPr lang="en-US"/>
           </a:p>
@@ -1380,7 +1382,7 @@
                 <a16:creationId xmlns:a16="http://schemas.microsoft.com/office/drawing/2014/main" id="{FF05EAE5-4812-F718-6D75-9627884180BF}"/>
               </a:ext>
               <a:ext uri="{C183D7F6-B498-43B3-948B-1728B52AA6E4}">
-                <adec:decorative xmlns:adec="http://schemas.microsoft.com/office/drawing/2017/decorative" val="1"/>
+                <adec:decorative xmlns:adec="http://schemas.microsoft.com/office/drawing/2017/decorative" xmlns="" val="1"/>
               </a:ext>
             </a:extLst>
           </p:cNvPr>
@@ -1622,7 +1624,7 @@
           <a:p>
             <a:fld id="{E579ABC2-0180-4F3A-A895-A85BC724D472}" type="datetime1">
               <a:rPr lang="en-US" smtClean="0"/>
-              <a:t>8/26/2025</a:t>
+              <a:t>9/16/2025</a:t>
             </a:fld>
             <a:endParaRPr lang="en-US"/>
           </a:p>
@@ -2040,7 +2042,7 @@
           <a:p>
             <a:fld id="{6AEEA9BA-4E8F-439E-BEA4-91FBA01E3F5F}" type="datetime1">
               <a:rPr lang="en-US" smtClean="0"/>
-              <a:t>8/26/2025</a:t>
+              <a:t>9/16/2025</a:t>
             </a:fld>
             <a:endParaRPr lang="en-US"/>
           </a:p>
@@ -2182,7 +2184,7 @@
           <a:p>
             <a:fld id="{BE15BF18-0007-481C-AA29-413124BC3EE7}" type="datetime1">
               <a:rPr lang="en-US" smtClean="0"/>
-              <a:t>8/26/2025</a:t>
+              <a:t>9/16/2025</a:t>
             </a:fld>
             <a:endParaRPr lang="en-US"/>
           </a:p>
@@ -2344,7 +2346,7 @@
           <a:p>
             <a:fld id="{09BE9870-3748-43AD-B547-02A075CB4A1D}" type="datetime1">
               <a:rPr lang="en-US" smtClean="0"/>
-              <a:t>8/26/2025</a:t>
+              <a:t>9/16/2025</a:t>
             </a:fld>
             <a:endParaRPr lang="en-US"/>
           </a:p>
@@ -2661,7 +2663,7 @@
           <a:p>
             <a:fld id="{558E7897-33C5-4F1A-9307-D068E37F3DC7}" type="datetime1">
               <a:rPr lang="en-US" smtClean="0"/>
-              <a:t>8/26/2025</a:t>
+              <a:t>9/16/2025</a:t>
             </a:fld>
             <a:endParaRPr lang="en-US"/>
           </a:p>
@@ -2956,7 +2958,7 @@
           <a:p>
             <a:fld id="{82E171BA-CC09-47C8-A6DF-F5C5CB59CEEC}" type="datetime1">
               <a:rPr lang="en-US" smtClean="0"/>
-              <a:t>8/26/2025</a:t>
+              <a:t>9/16/2025</a:t>
             </a:fld>
             <a:endParaRPr lang="en-US"/>
           </a:p>
@@ -3197,7 +3199,7 @@
           <a:p>
             <a:fld id="{7DA38F49-B3E2-4BF0-BEC7-C30D34ABBB8D}" type="datetime1">
               <a:rPr lang="en-US" smtClean="0"/>
-              <a:t>8/26/2025</a:t>
+              <a:t>9/16/2025</a:t>
             </a:fld>
             <a:endParaRPr lang="en-US"/>
           </a:p>
@@ -3297,7 +3299,7 @@
                 <a16:creationId xmlns:a16="http://schemas.microsoft.com/office/drawing/2014/main" id="{118E06E4-607B-144B-382B-AD3D06B1EE8C}"/>
               </a:ext>
               <a:ext uri="{C183D7F6-B498-43B3-948B-1728B52AA6E4}">
-                <adec:decorative xmlns:adec="http://schemas.microsoft.com/office/drawing/2017/decorative" val="1"/>
+                <adec:decorative xmlns:adec="http://schemas.microsoft.com/office/drawing/2017/decorative" xmlns="" val="1"/>
               </a:ext>
             </a:extLst>
           </p:cNvPr>
@@ -3674,7 +3676,7 @@
                 <a16:creationId xmlns:a16="http://schemas.microsoft.com/office/drawing/2014/main" id="{19F9BF86-FE94-4517-B97D-026C7515E589}"/>
               </a:ext>
               <a:ext uri="{C183D7F6-B498-43B3-948B-1728B52AA6E4}">
-                <adec:decorative xmlns:adec="http://schemas.microsoft.com/office/drawing/2017/decorative" val="1"/>
+                <adec:decorative xmlns:adec="http://schemas.microsoft.com/office/drawing/2017/decorative" xmlns="" val="1"/>
               </a:ext>
             </a:extLst>
           </p:cNvPr>
@@ -3815,7 +3817,7 @@
                 <a16:creationId xmlns:a16="http://schemas.microsoft.com/office/drawing/2014/main" id="{6E25B8EB-C8DD-E579-2093-D182FC5B0F46}"/>
               </a:ext>
               <a:ext uri="{C183D7F6-B498-43B3-948B-1728B52AA6E4}">
-                <adec:decorative xmlns:adec="http://schemas.microsoft.com/office/drawing/2017/decorative" val="1"/>
+                <adec:decorative xmlns:adec="http://schemas.microsoft.com/office/drawing/2017/decorative" xmlns="" val="1"/>
               </a:ext>
             </a:extLst>
           </p:cNvPr>
@@ -3958,10 +3960,350 @@
   <p:clrMapOvr>
     <a:overrideClrMapping bg1="dk1" tx1="lt1" bg2="dk2" tx2="lt2" accent1="accent1" accent2="accent2" accent3="accent3" accent4="accent4" accent5="accent5" accent6="accent6" hlink="hlink" folHlink="folHlink"/>
   </p:clrMapOvr>
+  <p:timing>
+    <p:tnLst>
+      <p:par>
+        <p:cTn id="1" dur="indefinite" restart="never" nodeType="tmRoot"/>
+      </p:par>
+    </p:tnLst>
+  </p:timing>
 </p:sld>
 </file>
 
 <file path=ppt/slides/slide10.xml><?xml version="1.0" encoding="utf-8"?>
+<p:sld xmlns:a="http://schemas.openxmlformats.org/drawingml/2006/main" xmlns:r="http://schemas.openxmlformats.org/officeDocument/2006/relationships" xmlns:p="http://schemas.openxmlformats.org/presentationml/2006/main">
+  <p:cSld>
+    <p:spTree>
+      <p:nvGrpSpPr>
+        <p:cNvPr id="1" name="">
+          <a:extLst>
+            <a:ext uri="{FF2B5EF4-FFF2-40B4-BE49-F238E27FC236}">
+              <a16:creationId xmlns:a16="http://schemas.microsoft.com/office/drawing/2014/main" id="{A61DD1B7-C249-8684-5202-1C2B0BE368B4}"/>
+            </a:ext>
+          </a:extLst>
+        </p:cNvPr>
+        <p:cNvGrpSpPr/>
+        <p:nvPr/>
+      </p:nvGrpSpPr>
+      <p:grpSpPr>
+        <a:xfrm>
+          <a:off x="0" y="0"/>
+          <a:ext cx="0" cy="0"/>
+          <a:chOff x="0" y="0"/>
+          <a:chExt cx="0" cy="0"/>
+        </a:xfrm>
+      </p:grpSpPr>
+      <p:pic>
+        <p:nvPicPr>
+          <p:cNvPr id="6" name="Content Placeholder 5" descr="Interface gráfica do usuário, Texto, Aplicativo, Email&#10;&#10;O conteúdo gerado por IA pode estar incorreto.">
+            <a:extLst>
+              <a:ext uri="{FF2B5EF4-FFF2-40B4-BE49-F238E27FC236}">
+                <a16:creationId xmlns:a16="http://schemas.microsoft.com/office/drawing/2014/main" id="{1E79329B-248B-87D2-2FFB-D67E8781971A}"/>
+              </a:ext>
+            </a:extLst>
+          </p:cNvPr>
+          <p:cNvPicPr>
+            <a:picLocks noGrp="1" noChangeAspect="1"/>
+          </p:cNvPicPr>
+          <p:nvPr>
+            <p:ph idx="1"/>
+          </p:nvPr>
+        </p:nvPicPr>
+        <p:blipFill>
+          <a:blip r:embed="rId2"/>
+          <a:stretch>
+            <a:fillRect/>
+          </a:stretch>
+        </p:blipFill>
+        <p:spPr>
+          <a:xfrm>
+            <a:off x="-5376" y="1108"/>
+            <a:ext cx="12205802" cy="6858575"/>
+          </a:xfrm>
+        </p:spPr>
+      </p:pic>
+      <p:sp>
+        <p:nvSpPr>
+          <p:cNvPr id="2" name="Title 1">
+            <a:extLst>
+              <a:ext uri="{FF2B5EF4-FFF2-40B4-BE49-F238E27FC236}">
+                <a16:creationId xmlns:a16="http://schemas.microsoft.com/office/drawing/2014/main" id="{312F96C5-C797-AE55-EB91-9253A9A7116F}"/>
+              </a:ext>
+            </a:extLst>
+          </p:cNvPr>
+          <p:cNvSpPr>
+            <a:spLocks noGrp="1"/>
+          </p:cNvSpPr>
+          <p:nvPr>
+            <p:ph type="title"/>
+          </p:nvPr>
+        </p:nvSpPr>
+        <p:spPr>
+          <a:xfrm>
+            <a:off x="424400" y="1233427"/>
+            <a:ext cx="11322279" cy="1145675"/>
+          </a:xfrm>
+        </p:spPr>
+        <p:txBody>
+          <a:bodyPr>
+            <a:normAutofit fontScale="90000"/>
+          </a:bodyPr>
+          <a:lstStyle/>
+          <a:p>
+            <a:r>
+              <a:rPr lang="pt-BR" sz="4400" dirty="0"/>
+              <a:t>Arquitetura do Sistema: </a:t>
+            </a:r>
+            <a:r>
+              <a:rPr lang="pt-BR" sz="4400" i="1" dirty="0" smtClean="0"/>
+              <a:t>Diagrama de Classes</a:t>
+            </a:r>
+            <a:endParaRPr lang="pt-BR" sz="4400" i="1" dirty="0"/>
+          </a:p>
+        </p:txBody>
+      </p:sp>
+      <p:sp>
+        <p:nvSpPr>
+          <p:cNvPr id="5" name="CaixaDeTexto 4">
+            <a:extLst>
+              <a:ext uri="{FF2B5EF4-FFF2-40B4-BE49-F238E27FC236}">
+                <a16:creationId xmlns:a16="http://schemas.microsoft.com/office/drawing/2014/main" id="{3C8F3216-209A-CC5C-3A63-106A8E921940}"/>
+              </a:ext>
+            </a:extLst>
+          </p:cNvPr>
+          <p:cNvSpPr txBox="1"/>
+          <p:nvPr/>
+        </p:nvSpPr>
+        <p:spPr>
+          <a:xfrm>
+            <a:off x="640076" y="2044807"/>
+            <a:ext cx="10890929" cy="4031873"/>
+          </a:xfrm>
+          <a:prstGeom prst="rect">
+            <a:avLst/>
+          </a:prstGeom>
+          <a:noFill/>
+        </p:spPr>
+        <p:txBody>
+          <a:bodyPr wrap="square">
+            <a:spAutoFit/>
+          </a:bodyPr>
+          <a:lstStyle/>
+          <a:p>
+            <a:pPr lvl="2"/>
+            <a:endParaRPr lang="pt-BR" sz="4000" dirty="0"/>
+          </a:p>
+          <a:p>
+            <a:pPr marL="571500" indent="-571500">
+              <a:buFont typeface="Arial" panose="020B0604020202020204" pitchFamily="34" charset="0"/>
+              <a:buChar char="•"/>
+            </a:pPr>
+            <a:r>
+              <a:rPr lang="pt-BR" sz="3600" dirty="0"/>
+              <a:t>Mostra a estrutura estática do sistema, com as entidades principais (</a:t>
+            </a:r>
+            <a:r>
+              <a:rPr lang="pt-BR" sz="3600" dirty="0" err="1"/>
+              <a:t>UserModel</a:t>
+            </a:r>
+            <a:r>
+              <a:rPr lang="pt-BR" sz="3600" dirty="0"/>
+              <a:t>, </a:t>
+            </a:r>
+            <a:r>
+              <a:rPr lang="pt-BR" sz="3600" dirty="0" err="1"/>
+              <a:t>Report</a:t>
+            </a:r>
+            <a:r>
+              <a:rPr lang="pt-BR" sz="3600" dirty="0"/>
+              <a:t>, Denuncia) e os relacionamentos entre elas</a:t>
+            </a:r>
+            <a:r>
+              <a:rPr lang="pt-BR" sz="3600" dirty="0" smtClean="0"/>
+              <a:t>.</a:t>
+            </a:r>
+          </a:p>
+          <a:p>
+            <a:pPr marL="571500" indent="-571500">
+              <a:buFont typeface="Arial" panose="020B0604020202020204" pitchFamily="34" charset="0"/>
+              <a:buChar char="•"/>
+            </a:pPr>
+            <a:endParaRPr lang="pt-BR" sz="3600" dirty="0"/>
+          </a:p>
+          <a:p>
+            <a:pPr marL="571500" indent="-571500">
+              <a:buFont typeface="Arial" panose="020B0604020202020204" pitchFamily="34" charset="0"/>
+              <a:buChar char="•"/>
+            </a:pPr>
+            <a:r>
+              <a:rPr lang="pt-BR" sz="3600" dirty="0"/>
+              <a:t>Evidencia as camadas (</a:t>
+            </a:r>
+            <a:r>
+              <a:rPr lang="pt-BR" sz="3600" dirty="0" err="1"/>
+              <a:t>domain</a:t>
+            </a:r>
+            <a:r>
+              <a:rPr lang="pt-BR" sz="3600" dirty="0"/>
+              <a:t>, </a:t>
+            </a:r>
+            <a:r>
+              <a:rPr lang="pt-BR" sz="3600" dirty="0" err="1"/>
+              <a:t>dao</a:t>
+            </a:r>
+            <a:r>
+              <a:rPr lang="pt-BR" sz="3600" dirty="0"/>
+              <a:t>, </a:t>
+            </a:r>
+            <a:r>
+              <a:rPr lang="pt-BR" sz="3600" dirty="0" err="1"/>
+              <a:t>service</a:t>
+            </a:r>
+            <a:r>
+              <a:rPr lang="pt-BR" sz="3600" dirty="0"/>
+              <a:t>, </a:t>
+            </a:r>
+            <a:r>
+              <a:rPr lang="pt-BR" sz="3600" dirty="0" err="1"/>
+              <a:t>controller</a:t>
+            </a:r>
+            <a:r>
+              <a:rPr lang="pt-BR" sz="3600" dirty="0" smtClean="0"/>
+              <a:t>).</a:t>
+            </a:r>
+            <a:endParaRPr lang="pt-BR" sz="3600" dirty="0"/>
+          </a:p>
+        </p:txBody>
+      </p:sp>
+    </p:spTree>
+    <p:extLst>
+      <p:ext uri="{BB962C8B-B14F-4D97-AF65-F5344CB8AC3E}">
+        <p14:creationId xmlns:p14="http://schemas.microsoft.com/office/powerpoint/2010/main" val="243770624"/>
+      </p:ext>
+    </p:extLst>
+  </p:cSld>
+  <p:clrMapOvr>
+    <a:masterClrMapping/>
+  </p:clrMapOvr>
+  <p:timing>
+    <p:tnLst>
+      <p:par>
+        <p:cTn id="1" dur="indefinite" restart="never" nodeType="tmRoot"/>
+      </p:par>
+    </p:tnLst>
+  </p:timing>
+</p:sld>
+</file>
+
+<file path=ppt/slides/slide11.xml><?xml version="1.0" encoding="utf-8"?>
+<p:sld xmlns:a="http://schemas.openxmlformats.org/drawingml/2006/main" xmlns:r="http://schemas.openxmlformats.org/officeDocument/2006/relationships" xmlns:p="http://schemas.openxmlformats.org/presentationml/2006/main">
+  <p:cSld>
+    <p:spTree>
+      <p:nvGrpSpPr>
+        <p:cNvPr id="1" name="">
+          <a:extLst>
+            <a:ext uri="{FF2B5EF4-FFF2-40B4-BE49-F238E27FC236}">
+              <a16:creationId xmlns:a16="http://schemas.microsoft.com/office/drawing/2014/main" id="{6310343B-0A06-5744-B47B-38105C385D8C}"/>
+            </a:ext>
+          </a:extLst>
+        </p:cNvPr>
+        <p:cNvGrpSpPr/>
+        <p:nvPr/>
+      </p:nvGrpSpPr>
+      <p:grpSpPr>
+        <a:xfrm>
+          <a:off x="0" y="0"/>
+          <a:ext cx="0" cy="0"/>
+          <a:chOff x="0" y="0"/>
+          <a:chExt cx="0" cy="0"/>
+        </a:xfrm>
+      </p:grpSpPr>
+      <p:pic>
+        <p:nvPicPr>
+          <p:cNvPr id="6" name="Content Placeholder 5" descr="Interface gráfica do usuário, Texto, Aplicativo, Email&#10;&#10;O conteúdo gerado por IA pode estar incorreto.">
+            <a:extLst>
+              <a:ext uri="{FF2B5EF4-FFF2-40B4-BE49-F238E27FC236}">
+                <a16:creationId xmlns:a16="http://schemas.microsoft.com/office/drawing/2014/main" id="{D18CC7D5-6998-4D24-E558-CA973CC1F789}"/>
+              </a:ext>
+            </a:extLst>
+          </p:cNvPr>
+          <p:cNvPicPr>
+            <a:picLocks noGrp="1" noChangeAspect="1"/>
+          </p:cNvPicPr>
+          <p:nvPr>
+            <p:ph idx="1"/>
+          </p:nvPr>
+        </p:nvPicPr>
+        <p:blipFill>
+          <a:blip r:embed="rId2"/>
+          <a:stretch>
+            <a:fillRect/>
+          </a:stretch>
+        </p:blipFill>
+        <p:spPr>
+          <a:xfrm>
+            <a:off x="-5376" y="1108"/>
+            <a:ext cx="12205802" cy="6858575"/>
+          </a:xfrm>
+        </p:spPr>
+      </p:pic>
+      <p:sp>
+        <p:nvSpPr>
+          <p:cNvPr id="2" name="Title 1">
+            <a:extLst>
+              <a:ext uri="{FF2B5EF4-FFF2-40B4-BE49-F238E27FC236}">
+                <a16:creationId xmlns:a16="http://schemas.microsoft.com/office/drawing/2014/main" id="{36C0DEDA-D064-DABE-85CF-EA23FDB158B0}"/>
+              </a:ext>
+            </a:extLst>
+          </p:cNvPr>
+          <p:cNvSpPr>
+            <a:spLocks noGrp="1"/>
+          </p:cNvSpPr>
+          <p:nvPr>
+            <p:ph type="title"/>
+          </p:nvPr>
+        </p:nvSpPr>
+        <p:spPr>
+          <a:xfrm>
+            <a:off x="2834639" y="3045699"/>
+            <a:ext cx="6522721" cy="766601"/>
+          </a:xfrm>
+        </p:spPr>
+        <p:txBody>
+          <a:bodyPr>
+            <a:normAutofit fontScale="90000"/>
+          </a:bodyPr>
+          <a:lstStyle/>
+          <a:p>
+            <a:r>
+              <a:rPr lang="pt-BR" sz="4400" dirty="0"/>
+              <a:t>Demonstração do projeto</a:t>
+            </a:r>
+            <a:endParaRPr lang="pt-BR" sz="4400" i="1" dirty="0"/>
+          </a:p>
+        </p:txBody>
+      </p:sp>
+    </p:spTree>
+    <p:extLst>
+      <p:ext uri="{BB962C8B-B14F-4D97-AF65-F5344CB8AC3E}">
+        <p14:creationId xmlns:p14="http://schemas.microsoft.com/office/powerpoint/2010/main" val="3528152653"/>
+      </p:ext>
+    </p:extLst>
+  </p:cSld>
+  <p:clrMapOvr>
+    <a:masterClrMapping/>
+  </p:clrMapOvr>
+  <p:timing>
+    <p:tnLst>
+      <p:par>
+        <p:cTn id="1" dur="indefinite" restart="never" nodeType="tmRoot"/>
+      </p:par>
+    </p:tnLst>
+  </p:timing>
+</p:sld>
+</file>
+
+<file path=ppt/slides/slide12.xml><?xml version="1.0" encoding="utf-8"?>
 <p:sld xmlns:a="http://schemas.openxmlformats.org/drawingml/2006/main" xmlns:r="http://schemas.openxmlformats.org/officeDocument/2006/relationships" xmlns:p="http://schemas.openxmlformats.org/presentationml/2006/main">
   <p:cSld>
     <p:spTree>
@@ -4048,6 +4390,10 @@
             <a:br>
               <a:rPr lang="pt-BR" dirty="0"/>
             </a:br>
+            <a:r>
+              <a:rPr lang="pt-BR" dirty="0"/>
+              <a:t/>
+            </a:r>
             <a:br>
               <a:rPr lang="pt-BR" dirty="0"/>
             </a:br>
@@ -4095,6 +4441,13 @@
   <p:clrMapOvr>
     <a:masterClrMapping/>
   </p:clrMapOvr>
+  <p:timing>
+    <p:tnLst>
+      <p:par>
+        <p:cTn id="1" dur="indefinite" restart="never" nodeType="tmRoot"/>
+      </p:par>
+    </p:tnLst>
+  </p:timing>
 </p:sld>
 </file>
 
@@ -4176,6 +4529,10 @@
               <a:rPr lang="pt-BR" i="1" dirty="0"/>
               <a:t>Fala, Cidade! Uma plataforma para o cidadão fiscalizar e a prefeitura ouvir.</a:t>
             </a:r>
+            <a:r>
+              <a:rPr lang="pt-BR" dirty="0"/>
+              <a:t/>
+            </a:r>
             <a:br>
               <a:rPr lang="pt-BR" dirty="0"/>
             </a:br>
@@ -4243,6 +4600,13 @@
   <p:clrMapOvr>
     <a:masterClrMapping/>
   </p:clrMapOvr>
+  <p:timing>
+    <p:tnLst>
+      <p:par>
+        <p:cTn id="1" dur="indefinite" restart="never" nodeType="tmRoot"/>
+      </p:par>
+    </p:tnLst>
+  </p:timing>
 </p:sld>
 </file>
 
@@ -4396,6 +4760,13 @@
   <p:clrMapOvr>
     <a:masterClrMapping/>
   </p:clrMapOvr>
+  <p:timing>
+    <p:tnLst>
+      <p:par>
+        <p:cTn id="1" dur="indefinite" restart="never" nodeType="tmRoot"/>
+      </p:par>
+    </p:tnLst>
+  </p:timing>
 </p:sld>
 </file>
 
@@ -4508,6 +4879,13 @@
   <p:clrMapOvr>
     <a:masterClrMapping/>
   </p:clrMapOvr>
+  <p:timing>
+    <p:tnLst>
+      <p:par>
+        <p:cTn id="1" dur="indefinite" restart="never" nodeType="tmRoot"/>
+      </p:par>
+    </p:tnLst>
+  </p:timing>
 </p:sld>
 </file>
 
@@ -4670,7 +5048,15 @@
             </a:pPr>
             <a:r>
               <a:rPr lang="pt-BR" sz="3200" dirty="0"/>
-              <a:t>Fornecer à gestão pública uma ferramenta para receber, classificar e gerenciar as denúncias.</a:t>
+              <a:t>Fornecer à gestão pública uma ferramenta para </a:t>
+            </a:r>
+            <a:r>
+              <a:rPr lang="pt-BR" sz="3200" dirty="0" smtClean="0"/>
+              <a:t>receber, e </a:t>
+            </a:r>
+            <a:r>
+              <a:rPr lang="pt-BR" sz="3200" dirty="0"/>
+              <a:t>gerenciar as denúncias.</a:t>
             </a:r>
           </a:p>
         </p:txBody>
@@ -4685,6 +5071,13 @@
   <p:clrMapOvr>
     <a:masterClrMapping/>
   </p:clrMapOvr>
+  <p:timing>
+    <p:tnLst>
+      <p:par>
+        <p:cTn id="1" dur="indefinite" restart="never" nodeType="tmRoot"/>
+      </p:par>
+    </p:tnLst>
+  </p:timing>
 </p:sld>
 </file>
 
@@ -4883,6 +5276,13 @@
   <p:clrMapOvr>
     <a:masterClrMapping/>
   </p:clrMapOvr>
+  <p:timing>
+    <p:tnLst>
+      <p:par>
+        <p:cTn id="1" dur="indefinite" restart="never" nodeType="tmRoot"/>
+      </p:par>
+    </p:tnLst>
+  </p:timing>
 </p:sld>
 </file>
 
@@ -4956,7 +5356,7 @@
         </p:nvSpPr>
         <p:spPr>
           <a:xfrm>
-            <a:off x="640079" y="1371601"/>
+            <a:off x="652060" y="1138845"/>
             <a:ext cx="10890929" cy="766601"/>
           </a:xfrm>
         </p:spPr>
@@ -5116,6 +5516,13 @@
   <p:clrMapOvr>
     <a:masterClrMapping/>
   </p:clrMapOvr>
+  <p:timing>
+    <p:tnLst>
+      <p:par>
+        <p:cTn id="1" dur="indefinite" restart="never" nodeType="tmRoot"/>
+      </p:par>
+    </p:tnLst>
+  </p:timing>
 </p:sld>
 </file>
 
@@ -5189,7 +5596,7 @@
         </p:nvSpPr>
         <p:spPr>
           <a:xfrm>
-            <a:off x="640079" y="1371601"/>
+            <a:off x="640077" y="1271848"/>
             <a:ext cx="10890929" cy="1295399"/>
           </a:xfrm>
         </p:spPr>
@@ -5268,6 +5675,13 @@
   <p:clrMapOvr>
     <a:masterClrMapping/>
   </p:clrMapOvr>
+  <p:timing>
+    <p:tnLst>
+      <p:par>
+        <p:cTn id="1" dur="indefinite" restart="never" nodeType="tmRoot"/>
+      </p:par>
+    </p:tnLst>
+  </p:timing>
 </p:sld>
 </file>
 
@@ -5279,7 +5693,7 @@
         <p:cNvPr id="1" name="">
           <a:extLst>
             <a:ext uri="{FF2B5EF4-FFF2-40B4-BE49-F238E27FC236}">
-              <a16:creationId xmlns:a16="http://schemas.microsoft.com/office/drawing/2014/main" id="{6310343B-0A06-5744-B47B-38105C385D8C}"/>
+              <a16:creationId xmlns:a16="http://schemas.microsoft.com/office/drawing/2014/main" id="{A61DD1B7-C249-8684-5202-1C2B0BE368B4}"/>
             </a:ext>
           </a:extLst>
         </p:cNvPr>
@@ -5299,7 +5713,7 @@
           <p:cNvPr id="6" name="Content Placeholder 5" descr="Interface gráfica do usuário, Texto, Aplicativo, Email&#10;&#10;O conteúdo gerado por IA pode estar incorreto.">
             <a:extLst>
               <a:ext uri="{FF2B5EF4-FFF2-40B4-BE49-F238E27FC236}">
-                <a16:creationId xmlns:a16="http://schemas.microsoft.com/office/drawing/2014/main" id="{D18CC7D5-6998-4D24-E558-CA973CC1F789}"/>
+                <a16:creationId xmlns:a16="http://schemas.microsoft.com/office/drawing/2014/main" id="{1E79329B-248B-87D2-2FFB-D67E8781971A}"/>
               </a:ext>
             </a:extLst>
           </p:cNvPr>
@@ -5328,7 +5742,7 @@
           <p:cNvPr id="2" name="Title 1">
             <a:extLst>
               <a:ext uri="{FF2B5EF4-FFF2-40B4-BE49-F238E27FC236}">
-                <a16:creationId xmlns:a16="http://schemas.microsoft.com/office/drawing/2014/main" id="{36C0DEDA-D064-DABE-85CF-EA23FDB158B0}"/>
+                <a16:creationId xmlns:a16="http://schemas.microsoft.com/office/drawing/2014/main" id="{312F96C5-C797-AE55-EB91-9253A9A7116F}"/>
               </a:ext>
             </a:extLst>
           </p:cNvPr>
@@ -5341,34 +5755,158 @@
         </p:nvSpPr>
         <p:spPr>
           <a:xfrm>
-            <a:off x="2834639" y="3045699"/>
-            <a:ext cx="6522721" cy="766601"/>
+            <a:off x="424400" y="1233427"/>
+            <a:ext cx="11322279" cy="1145675"/>
           </a:xfrm>
         </p:spPr>
         <p:txBody>
           <a:bodyPr>
-            <a:normAutofit/>
+            <a:normAutofit fontScale="90000"/>
           </a:bodyPr>
           <a:lstStyle/>
           <a:p>
             <a:r>
               <a:rPr lang="pt-BR" sz="4400" dirty="0"/>
-              <a:t>Demonstração do projeto</a:t>
+              <a:t>Arquitetura do Sistema: </a:t>
+            </a:r>
+            <a:r>
+              <a:rPr lang="pt-BR" sz="4400" i="1" dirty="0" smtClean="0"/>
+              <a:t>Diagrama de Classes</a:t>
             </a:r>
             <a:endParaRPr lang="pt-BR" sz="4400" i="1" dirty="0"/>
+          </a:p>
+        </p:txBody>
+      </p:sp>
+      <p:sp>
+        <p:nvSpPr>
+          <p:cNvPr id="5" name="CaixaDeTexto 4">
+            <a:extLst>
+              <a:ext uri="{FF2B5EF4-FFF2-40B4-BE49-F238E27FC236}">
+                <a16:creationId xmlns:a16="http://schemas.microsoft.com/office/drawing/2014/main" id="{3C8F3216-209A-CC5C-3A63-106A8E921940}"/>
+              </a:ext>
+            </a:extLst>
+          </p:cNvPr>
+          <p:cNvSpPr txBox="1"/>
+          <p:nvPr/>
+        </p:nvSpPr>
+        <p:spPr>
+          <a:xfrm>
+            <a:off x="640076" y="2044807"/>
+            <a:ext cx="10890929" cy="4031873"/>
+          </a:xfrm>
+          <a:prstGeom prst="rect">
+            <a:avLst/>
+          </a:prstGeom>
+          <a:noFill/>
+        </p:spPr>
+        <p:txBody>
+          <a:bodyPr wrap="square">
+            <a:spAutoFit/>
+          </a:bodyPr>
+          <a:lstStyle/>
+          <a:p>
+            <a:pPr lvl="2"/>
+            <a:endParaRPr lang="pt-BR" sz="4000" dirty="0"/>
+          </a:p>
+          <a:p>
+            <a:pPr marL="571500" indent="-571500">
+              <a:buFont typeface="Arial" panose="020B0604020202020204" pitchFamily="34" charset="0"/>
+              <a:buChar char="•"/>
+            </a:pPr>
+            <a:r>
+              <a:rPr lang="pt-BR" sz="3600" dirty="0"/>
+              <a:t>Mostra a estrutura estática do sistema, com as entidades principais (</a:t>
+            </a:r>
+            <a:r>
+              <a:rPr lang="pt-BR" sz="3600" dirty="0" err="1"/>
+              <a:t>UserModel</a:t>
+            </a:r>
+            <a:r>
+              <a:rPr lang="pt-BR" sz="3600" dirty="0"/>
+              <a:t>, </a:t>
+            </a:r>
+            <a:r>
+              <a:rPr lang="pt-BR" sz="3600" dirty="0" err="1"/>
+              <a:t>Report</a:t>
+            </a:r>
+            <a:r>
+              <a:rPr lang="pt-BR" sz="3600" dirty="0"/>
+              <a:t>, Denuncia) e os relacionamentos entre elas</a:t>
+            </a:r>
+            <a:r>
+              <a:rPr lang="pt-BR" sz="3600" dirty="0" smtClean="0"/>
+              <a:t>.</a:t>
+            </a:r>
+          </a:p>
+          <a:p>
+            <a:pPr marL="571500" indent="-571500">
+              <a:buFont typeface="Arial" panose="020B0604020202020204" pitchFamily="34" charset="0"/>
+              <a:buChar char="•"/>
+            </a:pPr>
+            <a:endParaRPr lang="pt-BR" sz="3600" dirty="0"/>
+          </a:p>
+          <a:p>
+            <a:pPr marL="571500" indent="-571500">
+              <a:buFont typeface="Arial" panose="020B0604020202020204" pitchFamily="34" charset="0"/>
+              <a:buChar char="•"/>
+            </a:pPr>
+            <a:r>
+              <a:rPr lang="pt-BR" sz="3600" dirty="0"/>
+              <a:t>Evidencia as camadas (</a:t>
+            </a:r>
+            <a:r>
+              <a:rPr lang="pt-BR" sz="3600" dirty="0" err="1"/>
+              <a:t>domain</a:t>
+            </a:r>
+            <a:r>
+              <a:rPr lang="pt-BR" sz="3600" dirty="0"/>
+              <a:t>, </a:t>
+            </a:r>
+            <a:r>
+              <a:rPr lang="pt-BR" sz="3600" dirty="0" err="1"/>
+              <a:t>dao</a:t>
+            </a:r>
+            <a:r>
+              <a:rPr lang="pt-BR" sz="3600" dirty="0"/>
+              <a:t>, </a:t>
+            </a:r>
+            <a:r>
+              <a:rPr lang="pt-BR" sz="3600" dirty="0" err="1"/>
+              <a:t>service</a:t>
+            </a:r>
+            <a:r>
+              <a:rPr lang="pt-BR" sz="3600" dirty="0"/>
+              <a:t>, </a:t>
+            </a:r>
+            <a:r>
+              <a:rPr lang="pt-BR" sz="3600" dirty="0" err="1"/>
+              <a:t>controller</a:t>
+            </a:r>
+            <a:r>
+              <a:rPr lang="pt-BR" sz="3600" dirty="0" smtClean="0"/>
+              <a:t>).</a:t>
+            </a:r>
+            <a:endParaRPr lang="pt-BR" sz="3600" dirty="0"/>
           </a:p>
         </p:txBody>
       </p:sp>
     </p:spTree>
     <p:extLst>
       <p:ext uri="{BB962C8B-B14F-4D97-AF65-F5344CB8AC3E}">
-        <p14:creationId xmlns:p14="http://schemas.microsoft.com/office/powerpoint/2010/main" val="3528152653"/>
+        <p14:creationId xmlns:p14="http://schemas.microsoft.com/office/powerpoint/2010/main" val="1734603098"/>
       </p:ext>
     </p:extLst>
   </p:cSld>
   <p:clrMapOvr>
     <a:masterClrMapping/>
   </p:clrMapOvr>
+  <p:timing>
+    <p:tnLst>
+      <p:par>
+        <p:cTn id="1" dur="indefinite" restart="never" nodeType="tmRoot"/>
+      </p:par>
+    </p:tnLst>
+  </p:timing>
 </p:sld>
 </file>
 

</xml_diff>

<commit_message>
feat: correcao da apresentacao
</commit_message>
<xml_diff>
--- a/Documentação/Fala-Cidade_Apresentacao.pptx
+++ b/Documentação/Fala-Cidade_Apresentacao.pptx
@@ -14,9 +14,8 @@
     <p:sldId id="267" r:id="rId8"/>
     <p:sldId id="268" r:id="rId9"/>
     <p:sldId id="269" r:id="rId10"/>
-    <p:sldId id="270" r:id="rId11"/>
-    <p:sldId id="266" r:id="rId12"/>
-    <p:sldId id="265" r:id="rId13"/>
+    <p:sldId id="266" r:id="rId11"/>
+    <p:sldId id="265" r:id="rId12"/>
   </p:sldIdLst>
   <p:sldSz cx="12192000" cy="6858000"/>
   <p:notesSz cx="6858000" cy="9144000"/>
@@ -287,7 +286,7 @@
           <a:p>
             <a:fld id="{6444479B-705B-4489-957E-7E8A228BDFA0}" type="datetime1">
               <a:rPr lang="en-US" smtClean="0"/>
-              <a:t>9/16/2025</a:t>
+              <a:t>9/18/2025</a:t>
             </a:fld>
             <a:endParaRPr lang="en-US"/>
           </a:p>
@@ -487,7 +486,7 @@
           <a:p>
             <a:fld id="{C07B66AD-7C08-490A-ADA4-B47E10FB2407}" type="datetime1">
               <a:rPr lang="en-US" smtClean="0"/>
-              <a:t>9/16/2025</a:t>
+              <a:t>9/18/2025</a:t>
             </a:fld>
             <a:endParaRPr lang="en-US"/>
           </a:p>
@@ -746,7 +745,7 @@
           <a:p>
             <a:fld id="{05B95027-4255-49E7-9841-CD21BCC99996}" type="datetime1">
               <a:rPr lang="en-US" smtClean="0"/>
-              <a:t>9/16/2025</a:t>
+              <a:t>9/18/2025</a:t>
             </a:fld>
             <a:endParaRPr lang="en-US"/>
           </a:p>
@@ -814,7 +813,7 @@
                 <a16:creationId xmlns:a16="http://schemas.microsoft.com/office/drawing/2014/main" id="{3230604F-219C-2DEE-830E-27274CC2FE19}"/>
               </a:ext>
               <a:ext uri="{C183D7F6-B498-43B3-948B-1728B52AA6E4}">
-                <adec:decorative xmlns:adec="http://schemas.microsoft.com/office/drawing/2017/decorative" xmlns="" val="1"/>
+                <adec:decorative xmlns:adec="http://schemas.microsoft.com/office/drawing/2017/decorative" val="1"/>
               </a:ext>
             </a:extLst>
           </p:cNvPr>
@@ -987,7 +986,7 @@
           <a:p>
             <a:fld id="{9F89F774-3FA6-43B8-9241-99959C8FD463}" type="datetime1">
               <a:rPr lang="en-US" smtClean="0"/>
-              <a:t>9/16/2025</a:t>
+              <a:t>9/18/2025</a:t>
             </a:fld>
             <a:endParaRPr lang="en-US"/>
           </a:p>
@@ -1314,7 +1313,7 @@
           <a:p>
             <a:fld id="{F9504452-5DCC-4FE2-A5C9-8A5EF6714D65}" type="datetime1">
               <a:rPr lang="en-US" smtClean="0"/>
-              <a:t>9/16/2025</a:t>
+              <a:t>9/18/2025</a:t>
             </a:fld>
             <a:endParaRPr lang="en-US"/>
           </a:p>
@@ -1382,7 +1381,7 @@
                 <a16:creationId xmlns:a16="http://schemas.microsoft.com/office/drawing/2014/main" id="{FF05EAE5-4812-F718-6D75-9627884180BF}"/>
               </a:ext>
               <a:ext uri="{C183D7F6-B498-43B3-948B-1728B52AA6E4}">
-                <adec:decorative xmlns:adec="http://schemas.microsoft.com/office/drawing/2017/decorative" xmlns="" val="1"/>
+                <adec:decorative xmlns:adec="http://schemas.microsoft.com/office/drawing/2017/decorative" val="1"/>
               </a:ext>
             </a:extLst>
           </p:cNvPr>
@@ -1624,7 +1623,7 @@
           <a:p>
             <a:fld id="{E579ABC2-0180-4F3A-A895-A85BC724D472}" type="datetime1">
               <a:rPr lang="en-US" smtClean="0"/>
-              <a:t>9/16/2025</a:t>
+              <a:t>9/18/2025</a:t>
             </a:fld>
             <a:endParaRPr lang="en-US"/>
           </a:p>
@@ -2042,7 +2041,7 @@
           <a:p>
             <a:fld id="{6AEEA9BA-4E8F-439E-BEA4-91FBA01E3F5F}" type="datetime1">
               <a:rPr lang="en-US" smtClean="0"/>
-              <a:t>9/16/2025</a:t>
+              <a:t>9/18/2025</a:t>
             </a:fld>
             <a:endParaRPr lang="en-US"/>
           </a:p>
@@ -2184,7 +2183,7 @@
           <a:p>
             <a:fld id="{BE15BF18-0007-481C-AA29-413124BC3EE7}" type="datetime1">
               <a:rPr lang="en-US" smtClean="0"/>
-              <a:t>9/16/2025</a:t>
+              <a:t>9/18/2025</a:t>
             </a:fld>
             <a:endParaRPr lang="en-US"/>
           </a:p>
@@ -2346,7 +2345,7 @@
           <a:p>
             <a:fld id="{09BE9870-3748-43AD-B547-02A075CB4A1D}" type="datetime1">
               <a:rPr lang="en-US" smtClean="0"/>
-              <a:t>9/16/2025</a:t>
+              <a:t>9/18/2025</a:t>
             </a:fld>
             <a:endParaRPr lang="en-US"/>
           </a:p>
@@ -2663,7 +2662,7 @@
           <a:p>
             <a:fld id="{558E7897-33C5-4F1A-9307-D068E37F3DC7}" type="datetime1">
               <a:rPr lang="en-US" smtClean="0"/>
-              <a:t>9/16/2025</a:t>
+              <a:t>9/18/2025</a:t>
             </a:fld>
             <a:endParaRPr lang="en-US"/>
           </a:p>
@@ -2958,7 +2957,7 @@
           <a:p>
             <a:fld id="{82E171BA-CC09-47C8-A6DF-F5C5CB59CEEC}" type="datetime1">
               <a:rPr lang="en-US" smtClean="0"/>
-              <a:t>9/16/2025</a:t>
+              <a:t>9/18/2025</a:t>
             </a:fld>
             <a:endParaRPr lang="en-US"/>
           </a:p>
@@ -3199,7 +3198,7 @@
           <a:p>
             <a:fld id="{7DA38F49-B3E2-4BF0-BEC7-C30D34ABBB8D}" type="datetime1">
               <a:rPr lang="en-US" smtClean="0"/>
-              <a:t>9/16/2025</a:t>
+              <a:t>9/18/2025</a:t>
             </a:fld>
             <a:endParaRPr lang="en-US"/>
           </a:p>
@@ -3299,7 +3298,7 @@
                 <a16:creationId xmlns:a16="http://schemas.microsoft.com/office/drawing/2014/main" id="{118E06E4-607B-144B-382B-AD3D06B1EE8C}"/>
               </a:ext>
               <a:ext uri="{C183D7F6-B498-43B3-948B-1728B52AA6E4}">
-                <adec:decorative xmlns:adec="http://schemas.microsoft.com/office/drawing/2017/decorative" xmlns="" val="1"/>
+                <adec:decorative xmlns:adec="http://schemas.microsoft.com/office/drawing/2017/decorative" val="1"/>
               </a:ext>
             </a:extLst>
           </p:cNvPr>
@@ -3676,7 +3675,7 @@
                 <a16:creationId xmlns:a16="http://schemas.microsoft.com/office/drawing/2014/main" id="{19F9BF86-FE94-4517-B97D-026C7515E589}"/>
               </a:ext>
               <a:ext uri="{C183D7F6-B498-43B3-948B-1728B52AA6E4}">
-                <adec:decorative xmlns:adec="http://schemas.microsoft.com/office/drawing/2017/decorative" xmlns="" val="1"/>
+                <adec:decorative xmlns:adec="http://schemas.microsoft.com/office/drawing/2017/decorative" val="1"/>
               </a:ext>
             </a:extLst>
           </p:cNvPr>
@@ -3817,7 +3816,7 @@
                 <a16:creationId xmlns:a16="http://schemas.microsoft.com/office/drawing/2014/main" id="{6E25B8EB-C8DD-E579-2093-D182FC5B0F46}"/>
               </a:ext>
               <a:ext uri="{C183D7F6-B498-43B3-948B-1728B52AA6E4}">
-                <adec:decorative xmlns:adec="http://schemas.microsoft.com/office/drawing/2017/decorative" xmlns="" val="1"/>
+                <adec:decorative xmlns:adec="http://schemas.microsoft.com/office/drawing/2017/decorative" val="1"/>
               </a:ext>
             </a:extLst>
           </p:cNvPr>
@@ -3960,242 +3959,10 @@
   <p:clrMapOvr>
     <a:overrideClrMapping bg1="dk1" tx1="lt1" bg2="dk2" tx2="lt2" accent1="accent1" accent2="accent2" accent3="accent3" accent4="accent4" accent5="accent5" accent6="accent6" hlink="hlink" folHlink="folHlink"/>
   </p:clrMapOvr>
-  <p:timing>
-    <p:tnLst>
-      <p:par>
-        <p:cTn id="1" dur="indefinite" restart="never" nodeType="tmRoot"/>
-      </p:par>
-    </p:tnLst>
-  </p:timing>
 </p:sld>
 </file>
 
 <file path=ppt/slides/slide10.xml><?xml version="1.0" encoding="utf-8"?>
-<p:sld xmlns:a="http://schemas.openxmlformats.org/drawingml/2006/main" xmlns:r="http://schemas.openxmlformats.org/officeDocument/2006/relationships" xmlns:p="http://schemas.openxmlformats.org/presentationml/2006/main">
-  <p:cSld>
-    <p:spTree>
-      <p:nvGrpSpPr>
-        <p:cNvPr id="1" name="">
-          <a:extLst>
-            <a:ext uri="{FF2B5EF4-FFF2-40B4-BE49-F238E27FC236}">
-              <a16:creationId xmlns:a16="http://schemas.microsoft.com/office/drawing/2014/main" id="{A61DD1B7-C249-8684-5202-1C2B0BE368B4}"/>
-            </a:ext>
-          </a:extLst>
-        </p:cNvPr>
-        <p:cNvGrpSpPr/>
-        <p:nvPr/>
-      </p:nvGrpSpPr>
-      <p:grpSpPr>
-        <a:xfrm>
-          <a:off x="0" y="0"/>
-          <a:ext cx="0" cy="0"/>
-          <a:chOff x="0" y="0"/>
-          <a:chExt cx="0" cy="0"/>
-        </a:xfrm>
-      </p:grpSpPr>
-      <p:pic>
-        <p:nvPicPr>
-          <p:cNvPr id="6" name="Content Placeholder 5" descr="Interface gráfica do usuário, Texto, Aplicativo, Email&#10;&#10;O conteúdo gerado por IA pode estar incorreto.">
-            <a:extLst>
-              <a:ext uri="{FF2B5EF4-FFF2-40B4-BE49-F238E27FC236}">
-                <a16:creationId xmlns:a16="http://schemas.microsoft.com/office/drawing/2014/main" id="{1E79329B-248B-87D2-2FFB-D67E8781971A}"/>
-              </a:ext>
-            </a:extLst>
-          </p:cNvPr>
-          <p:cNvPicPr>
-            <a:picLocks noGrp="1" noChangeAspect="1"/>
-          </p:cNvPicPr>
-          <p:nvPr>
-            <p:ph idx="1"/>
-          </p:nvPr>
-        </p:nvPicPr>
-        <p:blipFill>
-          <a:blip r:embed="rId2"/>
-          <a:stretch>
-            <a:fillRect/>
-          </a:stretch>
-        </p:blipFill>
-        <p:spPr>
-          <a:xfrm>
-            <a:off x="-5376" y="1108"/>
-            <a:ext cx="12205802" cy="6858575"/>
-          </a:xfrm>
-        </p:spPr>
-      </p:pic>
-      <p:sp>
-        <p:nvSpPr>
-          <p:cNvPr id="2" name="Title 1">
-            <a:extLst>
-              <a:ext uri="{FF2B5EF4-FFF2-40B4-BE49-F238E27FC236}">
-                <a16:creationId xmlns:a16="http://schemas.microsoft.com/office/drawing/2014/main" id="{312F96C5-C797-AE55-EB91-9253A9A7116F}"/>
-              </a:ext>
-            </a:extLst>
-          </p:cNvPr>
-          <p:cNvSpPr>
-            <a:spLocks noGrp="1"/>
-          </p:cNvSpPr>
-          <p:nvPr>
-            <p:ph type="title"/>
-          </p:nvPr>
-        </p:nvSpPr>
-        <p:spPr>
-          <a:xfrm>
-            <a:off x="424400" y="1233427"/>
-            <a:ext cx="11322279" cy="1145675"/>
-          </a:xfrm>
-        </p:spPr>
-        <p:txBody>
-          <a:bodyPr>
-            <a:normAutofit fontScale="90000"/>
-          </a:bodyPr>
-          <a:lstStyle/>
-          <a:p>
-            <a:r>
-              <a:rPr lang="pt-BR" sz="4400" dirty="0"/>
-              <a:t>Arquitetura do Sistema: </a:t>
-            </a:r>
-            <a:r>
-              <a:rPr lang="pt-BR" sz="4400" i="1" dirty="0" smtClean="0"/>
-              <a:t>Diagrama de Classes</a:t>
-            </a:r>
-            <a:endParaRPr lang="pt-BR" sz="4400" i="1" dirty="0"/>
-          </a:p>
-        </p:txBody>
-      </p:sp>
-      <p:sp>
-        <p:nvSpPr>
-          <p:cNvPr id="5" name="CaixaDeTexto 4">
-            <a:extLst>
-              <a:ext uri="{FF2B5EF4-FFF2-40B4-BE49-F238E27FC236}">
-                <a16:creationId xmlns:a16="http://schemas.microsoft.com/office/drawing/2014/main" id="{3C8F3216-209A-CC5C-3A63-106A8E921940}"/>
-              </a:ext>
-            </a:extLst>
-          </p:cNvPr>
-          <p:cNvSpPr txBox="1"/>
-          <p:nvPr/>
-        </p:nvSpPr>
-        <p:spPr>
-          <a:xfrm>
-            <a:off x="640076" y="2044807"/>
-            <a:ext cx="10890929" cy="4031873"/>
-          </a:xfrm>
-          <a:prstGeom prst="rect">
-            <a:avLst/>
-          </a:prstGeom>
-          <a:noFill/>
-        </p:spPr>
-        <p:txBody>
-          <a:bodyPr wrap="square">
-            <a:spAutoFit/>
-          </a:bodyPr>
-          <a:lstStyle/>
-          <a:p>
-            <a:pPr lvl="2"/>
-            <a:endParaRPr lang="pt-BR" sz="4000" dirty="0"/>
-          </a:p>
-          <a:p>
-            <a:pPr marL="571500" indent="-571500">
-              <a:buFont typeface="Arial" panose="020B0604020202020204" pitchFamily="34" charset="0"/>
-              <a:buChar char="•"/>
-            </a:pPr>
-            <a:r>
-              <a:rPr lang="pt-BR" sz="3600" dirty="0"/>
-              <a:t>Mostra a estrutura estática do sistema, com as entidades principais (</a:t>
-            </a:r>
-            <a:r>
-              <a:rPr lang="pt-BR" sz="3600" dirty="0" err="1"/>
-              <a:t>UserModel</a:t>
-            </a:r>
-            <a:r>
-              <a:rPr lang="pt-BR" sz="3600" dirty="0"/>
-              <a:t>, </a:t>
-            </a:r>
-            <a:r>
-              <a:rPr lang="pt-BR" sz="3600" dirty="0" err="1"/>
-              <a:t>Report</a:t>
-            </a:r>
-            <a:r>
-              <a:rPr lang="pt-BR" sz="3600" dirty="0"/>
-              <a:t>, Denuncia) e os relacionamentos entre elas</a:t>
-            </a:r>
-            <a:r>
-              <a:rPr lang="pt-BR" sz="3600" dirty="0" smtClean="0"/>
-              <a:t>.</a:t>
-            </a:r>
-          </a:p>
-          <a:p>
-            <a:pPr marL="571500" indent="-571500">
-              <a:buFont typeface="Arial" panose="020B0604020202020204" pitchFamily="34" charset="0"/>
-              <a:buChar char="•"/>
-            </a:pPr>
-            <a:endParaRPr lang="pt-BR" sz="3600" dirty="0"/>
-          </a:p>
-          <a:p>
-            <a:pPr marL="571500" indent="-571500">
-              <a:buFont typeface="Arial" panose="020B0604020202020204" pitchFamily="34" charset="0"/>
-              <a:buChar char="•"/>
-            </a:pPr>
-            <a:r>
-              <a:rPr lang="pt-BR" sz="3600" dirty="0"/>
-              <a:t>Evidencia as camadas (</a:t>
-            </a:r>
-            <a:r>
-              <a:rPr lang="pt-BR" sz="3600" dirty="0" err="1"/>
-              <a:t>domain</a:t>
-            </a:r>
-            <a:r>
-              <a:rPr lang="pt-BR" sz="3600" dirty="0"/>
-              <a:t>, </a:t>
-            </a:r>
-            <a:r>
-              <a:rPr lang="pt-BR" sz="3600" dirty="0" err="1"/>
-              <a:t>dao</a:t>
-            </a:r>
-            <a:r>
-              <a:rPr lang="pt-BR" sz="3600" dirty="0"/>
-              <a:t>, </a:t>
-            </a:r>
-            <a:r>
-              <a:rPr lang="pt-BR" sz="3600" dirty="0" err="1"/>
-              <a:t>service</a:t>
-            </a:r>
-            <a:r>
-              <a:rPr lang="pt-BR" sz="3600" dirty="0"/>
-              <a:t>, </a:t>
-            </a:r>
-            <a:r>
-              <a:rPr lang="pt-BR" sz="3600" dirty="0" err="1"/>
-              <a:t>controller</a:t>
-            </a:r>
-            <a:r>
-              <a:rPr lang="pt-BR" sz="3600" dirty="0" smtClean="0"/>
-              <a:t>).</a:t>
-            </a:r>
-            <a:endParaRPr lang="pt-BR" sz="3600" dirty="0"/>
-          </a:p>
-        </p:txBody>
-      </p:sp>
-    </p:spTree>
-    <p:extLst>
-      <p:ext uri="{BB962C8B-B14F-4D97-AF65-F5344CB8AC3E}">
-        <p14:creationId xmlns:p14="http://schemas.microsoft.com/office/powerpoint/2010/main" val="243770624"/>
-      </p:ext>
-    </p:extLst>
-  </p:cSld>
-  <p:clrMapOvr>
-    <a:masterClrMapping/>
-  </p:clrMapOvr>
-  <p:timing>
-    <p:tnLst>
-      <p:par>
-        <p:cTn id="1" dur="indefinite" restart="never" nodeType="tmRoot"/>
-      </p:par>
-    </p:tnLst>
-  </p:timing>
-</p:sld>
-</file>
-
-<file path=ppt/slides/slide11.xml><?xml version="1.0" encoding="utf-8"?>
 <p:sld xmlns:a="http://schemas.openxmlformats.org/drawingml/2006/main" xmlns:r="http://schemas.openxmlformats.org/officeDocument/2006/relationships" xmlns:p="http://schemas.openxmlformats.org/presentationml/2006/main">
   <p:cSld>
     <p:spTree>
@@ -4293,17 +4060,10 @@
   <p:clrMapOvr>
     <a:masterClrMapping/>
   </p:clrMapOvr>
-  <p:timing>
-    <p:tnLst>
-      <p:par>
-        <p:cTn id="1" dur="indefinite" restart="never" nodeType="tmRoot"/>
-      </p:par>
-    </p:tnLst>
-  </p:timing>
 </p:sld>
 </file>
 
-<file path=ppt/slides/slide12.xml><?xml version="1.0" encoding="utf-8"?>
+<file path=ppt/slides/slide11.xml><?xml version="1.0" encoding="utf-8"?>
 <p:sld xmlns:a="http://schemas.openxmlformats.org/drawingml/2006/main" xmlns:r="http://schemas.openxmlformats.org/officeDocument/2006/relationships" xmlns:p="http://schemas.openxmlformats.org/presentationml/2006/main">
   <p:cSld>
     <p:spTree>
@@ -4390,10 +4150,6 @@
             <a:br>
               <a:rPr lang="pt-BR" dirty="0"/>
             </a:br>
-            <a:r>
-              <a:rPr lang="pt-BR" dirty="0"/>
-              <a:t/>
-            </a:r>
             <a:br>
               <a:rPr lang="pt-BR" dirty="0"/>
             </a:br>
@@ -4441,13 +4197,6 @@
   <p:clrMapOvr>
     <a:masterClrMapping/>
   </p:clrMapOvr>
-  <p:timing>
-    <p:tnLst>
-      <p:par>
-        <p:cTn id="1" dur="indefinite" restart="never" nodeType="tmRoot"/>
-      </p:par>
-    </p:tnLst>
-  </p:timing>
 </p:sld>
 </file>
 
@@ -4529,10 +4278,6 @@
               <a:rPr lang="pt-BR" i="1" dirty="0"/>
               <a:t>Fala, Cidade! Uma plataforma para o cidadão fiscalizar e a prefeitura ouvir.</a:t>
             </a:r>
-            <a:r>
-              <a:rPr lang="pt-BR" dirty="0"/>
-              <a:t/>
-            </a:r>
             <a:br>
               <a:rPr lang="pt-BR" dirty="0"/>
             </a:br>
@@ -4600,13 +4345,6 @@
   <p:clrMapOvr>
     <a:masterClrMapping/>
   </p:clrMapOvr>
-  <p:timing>
-    <p:tnLst>
-      <p:par>
-        <p:cTn id="1" dur="indefinite" restart="never" nodeType="tmRoot"/>
-      </p:par>
-    </p:tnLst>
-  </p:timing>
 </p:sld>
 </file>
 
@@ -4760,13 +4498,6 @@
   <p:clrMapOvr>
     <a:masterClrMapping/>
   </p:clrMapOvr>
-  <p:timing>
-    <p:tnLst>
-      <p:par>
-        <p:cTn id="1" dur="indefinite" restart="never" nodeType="tmRoot"/>
-      </p:par>
-    </p:tnLst>
-  </p:timing>
 </p:sld>
 </file>
 
@@ -4879,13 +4610,6 @@
   <p:clrMapOvr>
     <a:masterClrMapping/>
   </p:clrMapOvr>
-  <p:timing>
-    <p:tnLst>
-      <p:par>
-        <p:cTn id="1" dur="indefinite" restart="never" nodeType="tmRoot"/>
-      </p:par>
-    </p:tnLst>
-  </p:timing>
 </p:sld>
 </file>
 
@@ -5048,15 +4772,7 @@
             </a:pPr>
             <a:r>
               <a:rPr lang="pt-BR" sz="3200" dirty="0"/>
-              <a:t>Fornecer à gestão pública uma ferramenta para </a:t>
-            </a:r>
-            <a:r>
-              <a:rPr lang="pt-BR" sz="3200" dirty="0" smtClean="0"/>
-              <a:t>receber, e </a:t>
-            </a:r>
-            <a:r>
-              <a:rPr lang="pt-BR" sz="3200" dirty="0"/>
-              <a:t>gerenciar as denúncias.</a:t>
+              <a:t>Fornecer à gestão pública uma ferramenta para receber, e gerenciar as denúncias.</a:t>
             </a:r>
           </a:p>
         </p:txBody>
@@ -5071,13 +4787,6 @@
   <p:clrMapOvr>
     <a:masterClrMapping/>
   </p:clrMapOvr>
-  <p:timing>
-    <p:tnLst>
-      <p:par>
-        <p:cTn id="1" dur="indefinite" restart="never" nodeType="tmRoot"/>
-      </p:par>
-    </p:tnLst>
-  </p:timing>
 </p:sld>
 </file>
 
@@ -5276,13 +4985,6 @@
   <p:clrMapOvr>
     <a:masterClrMapping/>
   </p:clrMapOvr>
-  <p:timing>
-    <p:tnLst>
-      <p:par>
-        <p:cTn id="1" dur="indefinite" restart="never" nodeType="tmRoot"/>
-      </p:par>
-    </p:tnLst>
-  </p:timing>
 </p:sld>
 </file>
 
@@ -5516,13 +5218,6 @@
   <p:clrMapOvr>
     <a:masterClrMapping/>
   </p:clrMapOvr>
-  <p:timing>
-    <p:tnLst>
-      <p:par>
-        <p:cTn id="1" dur="indefinite" restart="never" nodeType="tmRoot"/>
-      </p:par>
-    </p:tnLst>
-  </p:timing>
 </p:sld>
 </file>
 
@@ -5675,13 +5370,6 @@
   <p:clrMapOvr>
     <a:masterClrMapping/>
   </p:clrMapOvr>
-  <p:timing>
-    <p:tnLst>
-      <p:par>
-        <p:cTn id="1" dur="indefinite" restart="never" nodeType="tmRoot"/>
-      </p:par>
-    </p:tnLst>
-  </p:timing>
 </p:sld>
 </file>
 
@@ -5770,10 +5458,9 @@
               <a:t>Arquitetura do Sistema: </a:t>
             </a:r>
             <a:r>
-              <a:rPr lang="pt-BR" sz="4400" i="1" dirty="0" smtClean="0"/>
+              <a:rPr lang="pt-BR" sz="4400" i="1" dirty="0"/>
               <a:t>Diagrama de Classes</a:t>
             </a:r>
-            <a:endParaRPr lang="pt-BR" sz="4400" i="1" dirty="0"/>
           </a:p>
         </p:txBody>
       </p:sp>
@@ -5831,11 +5518,7 @@
             </a:r>
             <a:r>
               <a:rPr lang="pt-BR" sz="3600" dirty="0"/>
-              <a:t>, Denuncia) e os relacionamentos entre elas</a:t>
-            </a:r>
-            <a:r>
-              <a:rPr lang="pt-BR" sz="3600" dirty="0" smtClean="0"/>
-              <a:t>.</a:t>
+              <a:t>, Denuncia) e os relacionamentos entre elas.</a:t>
             </a:r>
           </a:p>
           <a:p>
@@ -5883,10 +5566,9 @@
               <a:t>controller</a:t>
             </a:r>
             <a:r>
-              <a:rPr lang="pt-BR" sz="3600" dirty="0" smtClean="0"/>
+              <a:rPr lang="pt-BR" sz="3600" dirty="0"/>
               <a:t>).</a:t>
             </a:r>
-            <a:endParaRPr lang="pt-BR" sz="3600" dirty="0"/>
           </a:p>
         </p:txBody>
       </p:sp>
@@ -5900,13 +5582,6 @@
   <p:clrMapOvr>
     <a:masterClrMapping/>
   </p:clrMapOvr>
-  <p:timing>
-    <p:tnLst>
-      <p:par>
-        <p:cTn id="1" dur="indefinite" restart="never" nodeType="tmRoot"/>
-      </p:par>
-    </p:tnLst>
-  </p:timing>
 </p:sld>
 </file>
 

</xml_diff>